<commit_message>
#39: Add APIs to remove paragraph portion
</commit_message>
<xml_diff>
--- a/tests/ShapeCrawler.UnitTests/Resource/002.pptx
+++ b/tests/ShapeCrawler.UnitTests/Resource/002.pptx
@@ -1263,7 +1263,7 @@
           <a:p>
             <a:fld id="{6A2D1428-0459-4F75-829F-043936AE8C9E}" type="datetimeFigureOut">
               <a:rPr lang="en-US" smtClean="0"/>
-              <a:t>12/23/2020</a:t>
+              <a:t>12/25/2020</a:t>
             </a:fld>
             <a:endParaRPr lang="en-US"/>
           </a:p>
@@ -1463,7 +1463,7 @@
           <a:p>
             <a:fld id="{6A2D1428-0459-4F75-829F-043936AE8C9E}" type="datetimeFigureOut">
               <a:rPr lang="en-US" smtClean="0"/>
-              <a:t>12/23/2020</a:t>
+              <a:t>12/25/2020</a:t>
             </a:fld>
             <a:endParaRPr lang="en-US"/>
           </a:p>
@@ -1673,7 +1673,7 @@
           <a:p>
             <a:fld id="{6A2D1428-0459-4F75-829F-043936AE8C9E}" type="datetimeFigureOut">
               <a:rPr lang="en-US" smtClean="0"/>
-              <a:t>12/23/2020</a:t>
+              <a:t>12/25/2020</a:t>
             </a:fld>
             <a:endParaRPr lang="en-US"/>
           </a:p>
@@ -1873,7 +1873,7 @@
           <a:p>
             <a:fld id="{6A2D1428-0459-4F75-829F-043936AE8C9E}" type="datetimeFigureOut">
               <a:rPr lang="en-US" smtClean="0"/>
-              <a:t>12/23/2020</a:t>
+              <a:t>12/25/2020</a:t>
             </a:fld>
             <a:endParaRPr lang="en-US"/>
           </a:p>
@@ -2149,7 +2149,7 @@
           <a:p>
             <a:fld id="{6A2D1428-0459-4F75-829F-043936AE8C9E}" type="datetimeFigureOut">
               <a:rPr lang="en-US" smtClean="0"/>
-              <a:t>12/23/2020</a:t>
+              <a:t>12/25/2020</a:t>
             </a:fld>
             <a:endParaRPr lang="en-US"/>
           </a:p>
@@ -2417,7 +2417,7 @@
           <a:p>
             <a:fld id="{6A2D1428-0459-4F75-829F-043936AE8C9E}" type="datetimeFigureOut">
               <a:rPr lang="en-US" smtClean="0"/>
-              <a:t>12/23/2020</a:t>
+              <a:t>12/25/2020</a:t>
             </a:fld>
             <a:endParaRPr lang="en-US"/>
           </a:p>
@@ -2832,7 +2832,7 @@
           <a:p>
             <a:fld id="{6A2D1428-0459-4F75-829F-043936AE8C9E}" type="datetimeFigureOut">
               <a:rPr lang="en-US" smtClean="0"/>
-              <a:t>12/23/2020</a:t>
+              <a:t>12/25/2020</a:t>
             </a:fld>
             <a:endParaRPr lang="en-US"/>
           </a:p>
@@ -2974,7 +2974,7 @@
           <a:p>
             <a:fld id="{6A2D1428-0459-4F75-829F-043936AE8C9E}" type="datetimeFigureOut">
               <a:rPr lang="en-US" smtClean="0"/>
-              <a:t>12/23/2020</a:t>
+              <a:t>12/25/2020</a:t>
             </a:fld>
             <a:endParaRPr lang="en-US"/>
           </a:p>
@@ -3087,7 +3087,7 @@
           <a:p>
             <a:fld id="{6A2D1428-0459-4F75-829F-043936AE8C9E}" type="datetimeFigureOut">
               <a:rPr lang="en-US" smtClean="0"/>
-              <a:t>12/23/2020</a:t>
+              <a:t>12/25/2020</a:t>
             </a:fld>
             <a:endParaRPr lang="en-US"/>
           </a:p>
@@ -3400,7 +3400,7 @@
           <a:p>
             <a:fld id="{6A2D1428-0459-4F75-829F-043936AE8C9E}" type="datetimeFigureOut">
               <a:rPr lang="en-US" smtClean="0"/>
-              <a:t>12/23/2020</a:t>
+              <a:t>12/25/2020</a:t>
             </a:fld>
             <a:endParaRPr lang="en-US"/>
           </a:p>
@@ -3689,7 +3689,7 @@
           <a:p>
             <a:fld id="{6A2D1428-0459-4F75-829F-043936AE8C9E}" type="datetimeFigureOut">
               <a:rPr lang="en-US" smtClean="0"/>
-              <a:t>12/23/2020</a:t>
+              <a:t>12/25/2020</a:t>
             </a:fld>
             <a:endParaRPr lang="en-US"/>
           </a:p>
@@ -3932,7 +3932,7 @@
           <a:p>
             <a:fld id="{6A2D1428-0459-4F75-829F-043936AE8C9E}" type="datetimeFigureOut">
               <a:rPr lang="en-US" smtClean="0"/>
-              <a:t>12/23/2020</a:t>
+              <a:t>12/25/2020</a:t>
             </a:fld>
             <a:endParaRPr lang="en-US"/>
           </a:p>
@@ -4742,7 +4742,7 @@
         <p:spPr>
           <a:xfrm>
             <a:off x="6359580" y="1555262"/>
-            <a:ext cx="1211550" cy="646331"/>
+            <a:ext cx="1578637" cy="646331"/>
           </a:xfrm>
           <a:prstGeom prst="rect">
             <a:avLst/>
@@ -4773,8 +4773,12 @@
               <a:buAutoNum type="arabicPeriod"/>
             </a:pPr>
             <a:r>
+              <a:rPr lang="en-US" b="1" dirty="0"/>
+              <a:t>id5</a:t>
+            </a:r>
+            <a:r>
               <a:rPr lang="en-US" dirty="0"/>
-              <a:t>Test-p6</a:t>
+              <a:t>-Test-p6</a:t>
             </a:r>
           </a:p>
           <a:p>

</xml_diff>

<commit_message>
#26: Add setter for shape's paragraph
</commit_message>
<xml_diff>
--- a/tests/ShapeCrawler.UnitTests/Resource/002.pptx
+++ b/tests/ShapeCrawler.UnitTests/Resource/002.pptx
@@ -1263,7 +1263,7 @@
           <a:p>
             <a:fld id="{6A2D1428-0459-4F75-829F-043936AE8C9E}" type="datetimeFigureOut">
               <a:rPr lang="en-US" smtClean="0"/>
-              <a:t>12/25/2020</a:t>
+              <a:t>12/27/2020</a:t>
             </a:fld>
             <a:endParaRPr lang="en-US"/>
           </a:p>
@@ -1463,7 +1463,7 @@
           <a:p>
             <a:fld id="{6A2D1428-0459-4F75-829F-043936AE8C9E}" type="datetimeFigureOut">
               <a:rPr lang="en-US" smtClean="0"/>
-              <a:t>12/25/2020</a:t>
+              <a:t>12/27/2020</a:t>
             </a:fld>
             <a:endParaRPr lang="en-US"/>
           </a:p>
@@ -1673,7 +1673,7 @@
           <a:p>
             <a:fld id="{6A2D1428-0459-4F75-829F-043936AE8C9E}" type="datetimeFigureOut">
               <a:rPr lang="en-US" smtClean="0"/>
-              <a:t>12/25/2020</a:t>
+              <a:t>12/27/2020</a:t>
             </a:fld>
             <a:endParaRPr lang="en-US"/>
           </a:p>
@@ -1873,7 +1873,7 @@
           <a:p>
             <a:fld id="{6A2D1428-0459-4F75-829F-043936AE8C9E}" type="datetimeFigureOut">
               <a:rPr lang="en-US" smtClean="0"/>
-              <a:t>12/25/2020</a:t>
+              <a:t>12/27/2020</a:t>
             </a:fld>
             <a:endParaRPr lang="en-US"/>
           </a:p>
@@ -2149,7 +2149,7 @@
           <a:p>
             <a:fld id="{6A2D1428-0459-4F75-829F-043936AE8C9E}" type="datetimeFigureOut">
               <a:rPr lang="en-US" smtClean="0"/>
-              <a:t>12/25/2020</a:t>
+              <a:t>12/27/2020</a:t>
             </a:fld>
             <a:endParaRPr lang="en-US"/>
           </a:p>
@@ -2417,7 +2417,7 @@
           <a:p>
             <a:fld id="{6A2D1428-0459-4F75-829F-043936AE8C9E}" type="datetimeFigureOut">
               <a:rPr lang="en-US" smtClean="0"/>
-              <a:t>12/25/2020</a:t>
+              <a:t>12/27/2020</a:t>
             </a:fld>
             <a:endParaRPr lang="en-US"/>
           </a:p>
@@ -2832,7 +2832,7 @@
           <a:p>
             <a:fld id="{6A2D1428-0459-4F75-829F-043936AE8C9E}" type="datetimeFigureOut">
               <a:rPr lang="en-US" smtClean="0"/>
-              <a:t>12/25/2020</a:t>
+              <a:t>12/27/2020</a:t>
             </a:fld>
             <a:endParaRPr lang="en-US"/>
           </a:p>
@@ -2974,7 +2974,7 @@
           <a:p>
             <a:fld id="{6A2D1428-0459-4F75-829F-043936AE8C9E}" type="datetimeFigureOut">
               <a:rPr lang="en-US" smtClean="0"/>
-              <a:t>12/25/2020</a:t>
+              <a:t>12/27/2020</a:t>
             </a:fld>
             <a:endParaRPr lang="en-US"/>
           </a:p>
@@ -3087,7 +3087,7 @@
           <a:p>
             <a:fld id="{6A2D1428-0459-4F75-829F-043936AE8C9E}" type="datetimeFigureOut">
               <a:rPr lang="en-US" smtClean="0"/>
-              <a:t>12/25/2020</a:t>
+              <a:t>12/27/2020</a:t>
             </a:fld>
             <a:endParaRPr lang="en-US"/>
           </a:p>
@@ -3400,7 +3400,7 @@
           <a:p>
             <a:fld id="{6A2D1428-0459-4F75-829F-043936AE8C9E}" type="datetimeFigureOut">
               <a:rPr lang="en-US" smtClean="0"/>
-              <a:t>12/25/2020</a:t>
+              <a:t>12/27/2020</a:t>
             </a:fld>
             <a:endParaRPr lang="en-US"/>
           </a:p>
@@ -3689,7 +3689,7 @@
           <a:p>
             <a:fld id="{6A2D1428-0459-4F75-829F-043936AE8C9E}" type="datetimeFigureOut">
               <a:rPr lang="en-US" smtClean="0"/>
-              <a:t>12/25/2020</a:t>
+              <a:t>12/27/2020</a:t>
             </a:fld>
             <a:endParaRPr lang="en-US"/>
           </a:p>
@@ -3932,7 +3932,7 @@
           <a:p>
             <a:fld id="{6A2D1428-0459-4F75-829F-043936AE8C9E}" type="datetimeFigureOut">
               <a:rPr lang="en-US" smtClean="0"/>
-              <a:t>12/25/2020</a:t>
+              <a:t>12/27/2020</a:t>
             </a:fld>
             <a:endParaRPr lang="en-US"/>
           </a:p>
@@ -4562,7 +4562,7 @@
         <p:spPr>
           <a:xfrm>
             <a:off x="1914769" y="1555262"/>
-            <a:ext cx="1153842" cy="923330"/>
+            <a:ext cx="1516121" cy="923330"/>
           </a:xfrm>
           <a:prstGeom prst="rect">
             <a:avLst/>
@@ -4593,8 +4593,12 @@
               <a:buChar char="•"/>
             </a:pPr>
             <a:r>
+              <a:rPr lang="en-US" b="1" dirty="0"/>
+              <a:t>Test</a:t>
+            </a:r>
+            <a:r>
               <a:rPr lang="en-US" dirty="0"/>
-              <a:t>Test-p1</a:t>
+              <a:t>-p1</a:t>
             </a:r>
           </a:p>
           <a:p>
@@ -4608,7 +4612,7 @@
             </a:pPr>
             <a:r>
               <a:rPr lang="en-US" dirty="0"/>
-              <a:t>Test-p2</a:t>
+              <a:t>id4-Test-p2</a:t>
             </a:r>
           </a:p>
           <a:p>
@@ -4618,8 +4622,12 @@
               </a:buClr>
             </a:pPr>
             <a:r>
+              <a:rPr lang="en-US" b="1" dirty="0"/>
+              <a:t>Test</a:t>
+            </a:r>
+            <a:r>
               <a:rPr lang="en-US" dirty="0"/>
-              <a:t>Test-p3</a:t>
+              <a:t>-p3</a:t>
             </a:r>
             <a:endParaRPr lang="ru-RU" dirty="0"/>
           </a:p>

</xml_diff>